<commit_message>
master and child process
</commit_message>
<xml_diff>
--- a/real_life_concurrency_problems/nodejs_real_life_concurrency_problems.pptx
+++ b/real_life_concurrency_problems/nodejs_real_life_concurrency_problems.pptx
@@ -142,7 +142,7 @@
   </p:defaultTextStyle>
   <p:extLst>
     <p:ext uri="{EFAFB233-063F-42B5-8137-9DF3F51BA10A}">
-      <p15:sldGuideLst xmlns="" xmlns:p15="http://schemas.microsoft.com/office/powerpoint/2012/main">
+      <p15:sldGuideLst xmlns:p15="http://schemas.microsoft.com/office/powerpoint/2012/main" xmlns="">
         <p15:guide id="1" orient="horz" pos="2160">
           <p15:clr>
             <a:srgbClr val="A4A3A4"/>
@@ -7135,7 +7135,7 @@
           <p:cNvPr id="5" name="Right Arrow 8">
             <a:extLst>
               <a:ext uri="{FF2B5EF4-FFF2-40B4-BE49-F238E27FC236}">
-                <a16:creationId xmlns="" xmlns:a16="http://schemas.microsoft.com/office/drawing/2014/main" id="{9B6A5C66-3111-42AA-9715-A250ECC26D8A}"/>
+                <a16:creationId xmlns:a16="http://schemas.microsoft.com/office/drawing/2014/main" xmlns="" id="{9B6A5C66-3111-42AA-9715-A250ECC26D8A}"/>
               </a:ext>
             </a:extLst>
           </p:cNvPr>
@@ -7242,7 +7242,7 @@
           <p:cNvPr id="9" name="Right Arrow 8">
             <a:extLst>
               <a:ext uri="{FF2B5EF4-FFF2-40B4-BE49-F238E27FC236}">
-                <a16:creationId xmlns="" xmlns:a16="http://schemas.microsoft.com/office/drawing/2014/main" id="{9B6A5C66-3111-42AA-9715-A250ECC26D8A}"/>
+                <a16:creationId xmlns:a16="http://schemas.microsoft.com/office/drawing/2014/main" xmlns="" id="{9B6A5C66-3111-42AA-9715-A250ECC26D8A}"/>
               </a:ext>
             </a:extLst>
           </p:cNvPr>
@@ -7333,7 +7333,7 @@
           <p:cNvPr id="11" name="Right Arrow 10">
             <a:extLst>
               <a:ext uri="{FF2B5EF4-FFF2-40B4-BE49-F238E27FC236}">
-                <a16:creationId xmlns="" xmlns:a16="http://schemas.microsoft.com/office/drawing/2014/main" id="{9B6A5C66-3111-42AA-9715-A250ECC26D8A}"/>
+                <a16:creationId xmlns:a16="http://schemas.microsoft.com/office/drawing/2014/main" xmlns="" id="{9B6A5C66-3111-42AA-9715-A250ECC26D8A}"/>
               </a:ext>
             </a:extLst>
           </p:cNvPr>
@@ -7424,7 +7424,7 @@
           <p:cNvPr id="13" name="Right Arrow 12">
             <a:extLst>
               <a:ext uri="{FF2B5EF4-FFF2-40B4-BE49-F238E27FC236}">
-                <a16:creationId xmlns="" xmlns:a16="http://schemas.microsoft.com/office/drawing/2014/main" id="{9B6A5C66-3111-42AA-9715-A250ECC26D8A}"/>
+                <a16:creationId xmlns:a16="http://schemas.microsoft.com/office/drawing/2014/main" xmlns="" id="{9B6A5C66-3111-42AA-9715-A250ECC26D8A}"/>
               </a:ext>
             </a:extLst>
           </p:cNvPr>
@@ -7518,7 +7518,7 @@
           <p:cNvPr id="15" name="Right Arrow 14">
             <a:extLst>
               <a:ext uri="{FF2B5EF4-FFF2-40B4-BE49-F238E27FC236}">
-                <a16:creationId xmlns="" xmlns:a16="http://schemas.microsoft.com/office/drawing/2014/main" id="{9B6A5C66-3111-42AA-9715-A250ECC26D8A}"/>
+                <a16:creationId xmlns:a16="http://schemas.microsoft.com/office/drawing/2014/main" xmlns="" id="{9B6A5C66-3111-42AA-9715-A250ECC26D8A}"/>
               </a:ext>
             </a:extLst>
           </p:cNvPr>
@@ -7764,7 +7764,7 @@
           <p:cNvPr id="5" name="Right Arrow 8">
             <a:extLst>
               <a:ext uri="{FF2B5EF4-FFF2-40B4-BE49-F238E27FC236}">
-                <a16:creationId xmlns="" xmlns:a16="http://schemas.microsoft.com/office/drawing/2014/main" id="{9B6A5C66-3111-42AA-9715-A250ECC26D8A}"/>
+                <a16:creationId xmlns:a16="http://schemas.microsoft.com/office/drawing/2014/main" xmlns="" id="{9B6A5C66-3111-42AA-9715-A250ECC26D8A}"/>
               </a:ext>
             </a:extLst>
           </p:cNvPr>
@@ -7855,7 +7855,7 @@
           <p:cNvPr id="7" name="Right Arrow 8">
             <a:extLst>
               <a:ext uri="{FF2B5EF4-FFF2-40B4-BE49-F238E27FC236}">
-                <a16:creationId xmlns="" xmlns:a16="http://schemas.microsoft.com/office/drawing/2014/main" id="{9B6A5C66-3111-42AA-9715-A250ECC26D8A}"/>
+                <a16:creationId xmlns:a16="http://schemas.microsoft.com/office/drawing/2014/main" xmlns="" id="{9B6A5C66-3111-42AA-9715-A250ECC26D8A}"/>
               </a:ext>
             </a:extLst>
           </p:cNvPr>
@@ -8008,7 +8008,7 @@
           <p:cNvPr id="10" name="Right Arrow 8">
             <a:extLst>
               <a:ext uri="{FF2B5EF4-FFF2-40B4-BE49-F238E27FC236}">
-                <a16:creationId xmlns="" xmlns:a16="http://schemas.microsoft.com/office/drawing/2014/main" id="{9B6A5C66-3111-42AA-9715-A250ECC26D8A}"/>
+                <a16:creationId xmlns:a16="http://schemas.microsoft.com/office/drawing/2014/main" xmlns="" id="{9B6A5C66-3111-42AA-9715-A250ECC26D8A}"/>
               </a:ext>
             </a:extLst>
           </p:cNvPr>
@@ -8056,7 +8056,7 @@
           <p:cNvPr id="11" name="Right Arrow 8">
             <a:extLst>
               <a:ext uri="{FF2B5EF4-FFF2-40B4-BE49-F238E27FC236}">
-                <a16:creationId xmlns="" xmlns:a16="http://schemas.microsoft.com/office/drawing/2014/main" id="{9B6A5C66-3111-42AA-9715-A250ECC26D8A}"/>
+                <a16:creationId xmlns:a16="http://schemas.microsoft.com/office/drawing/2014/main" xmlns="" id="{9B6A5C66-3111-42AA-9715-A250ECC26D8A}"/>
               </a:ext>
             </a:extLst>
           </p:cNvPr>
@@ -8147,7 +8147,7 @@
           <p:cNvPr id="13" name="Right Arrow 8">
             <a:extLst>
               <a:ext uri="{FF2B5EF4-FFF2-40B4-BE49-F238E27FC236}">
-                <a16:creationId xmlns="" xmlns:a16="http://schemas.microsoft.com/office/drawing/2014/main" id="{9B6A5C66-3111-42AA-9715-A250ECC26D8A}"/>
+                <a16:creationId xmlns:a16="http://schemas.microsoft.com/office/drawing/2014/main" xmlns="" id="{9B6A5C66-3111-42AA-9715-A250ECC26D8A}"/>
               </a:ext>
             </a:extLst>
           </p:cNvPr>
@@ -8238,7 +8238,7 @@
           <p:cNvPr id="15" name="Right Arrow 8">
             <a:extLst>
               <a:ext uri="{FF2B5EF4-FFF2-40B4-BE49-F238E27FC236}">
-                <a16:creationId xmlns="" xmlns:a16="http://schemas.microsoft.com/office/drawing/2014/main" id="{9B6A5C66-3111-42AA-9715-A250ECC26D8A}"/>
+                <a16:creationId xmlns:a16="http://schemas.microsoft.com/office/drawing/2014/main" xmlns="" id="{9B6A5C66-3111-42AA-9715-A250ECC26D8A}"/>
               </a:ext>
             </a:extLst>
           </p:cNvPr>
@@ -8375,7 +8375,7 @@
           <p:cNvPr id="18" name="Right Arrow 8">
             <a:extLst>
               <a:ext uri="{FF2B5EF4-FFF2-40B4-BE49-F238E27FC236}">
-                <a16:creationId xmlns="" xmlns:a16="http://schemas.microsoft.com/office/drawing/2014/main" id="{9B6A5C66-3111-42AA-9715-A250ECC26D8A}"/>
+                <a16:creationId xmlns:a16="http://schemas.microsoft.com/office/drawing/2014/main" xmlns="" id="{9B6A5C66-3111-42AA-9715-A250ECC26D8A}"/>
               </a:ext>
             </a:extLst>
           </p:cNvPr>
@@ -8892,11 +8892,7 @@
           <a:p>
             <a:r>
               <a:rPr lang="en-US" dirty="0" smtClean="0"/>
-              <a:t>Why do we have concurrency In Node.js in </a:t>
-            </a:r>
-            <a:r>
-              <a:rPr lang="en-US" dirty="0" smtClean="0"/>
-              <a:t>our servers</a:t>
+              <a:t>Why do we have concurrency In Node.js in our servers</a:t>
             </a:r>
             <a:endParaRPr lang="he-IL" dirty="0"/>
           </a:p>
@@ -9694,11 +9690,7 @@
           <a:p>
             <a:r>
               <a:rPr lang="en-US" dirty="0" smtClean="0"/>
-              <a:t>Single Node </a:t>
-            </a:r>
-            <a:r>
-              <a:rPr lang="en-US" dirty="0" smtClean="0"/>
-              <a:t>– Lock Object + Sticky Session</a:t>
+              <a:t>Single Node – Lock Object + Sticky Session</a:t>
             </a:r>
             <a:endParaRPr lang="en-US" dirty="0"/>
           </a:p>
@@ -9740,27 +9732,18 @@
             <a:pPr lvl="1"/>
             <a:r>
               <a:rPr lang="en-US" b="1" dirty="0" smtClean="0"/>
-              <a:t>Single Node </a:t>
-            </a:r>
-            <a:r>
-              <a:rPr lang="en-US" b="1" dirty="0" smtClean="0"/>
-              <a:t> </a:t>
+              <a:t>Single Node  </a:t>
             </a:r>
             <a:r>
               <a:rPr lang="en-US" dirty="0" smtClean="0"/>
               <a:t>– </a:t>
             </a:r>
-            <a:endParaRPr lang="en-US" dirty="0" smtClean="0"/>
           </a:p>
           <a:p>
             <a:pPr lvl="2"/>
             <a:r>
               <a:rPr lang="en-US" dirty="0" smtClean="0"/>
-              <a:t>locking </a:t>
-            </a:r>
-            <a:r>
-              <a:rPr lang="en-US" dirty="0" smtClean="0"/>
-              <a:t>the object in memory </a:t>
+              <a:t>locking the object in memory </a:t>
             </a:r>
             <a:endParaRPr lang="en-US" dirty="0"/>
           </a:p>
@@ -9768,11 +9751,7 @@
             <a:pPr lvl="2"/>
             <a:r>
               <a:rPr lang="en-US" dirty="0" smtClean="0"/>
-              <a:t>requests </a:t>
-            </a:r>
-            <a:r>
-              <a:rPr lang="en-US" dirty="0" smtClean="0"/>
-              <a:t>that will try to access the object will wait  </a:t>
+              <a:t>requests that will try to access the object will wait  </a:t>
             </a:r>
           </a:p>
           <a:p>
@@ -9790,11 +9769,7 @@
             <a:pPr lvl="2"/>
             <a:r>
               <a:rPr lang="en-US" dirty="0" smtClean="0"/>
-              <a:t>sticky </a:t>
-            </a:r>
-            <a:r>
-              <a:rPr lang="en-US" dirty="0" smtClean="0"/>
-              <a:t>session on the object </a:t>
+              <a:t>sticky session on the object </a:t>
             </a:r>
             <a:endParaRPr lang="en-US" dirty="0"/>
           </a:p>
@@ -9806,11 +9781,7 @@
             </a:r>
             <a:r>
               <a:rPr lang="en-US" dirty="0" smtClean="0"/>
-              <a:t>ll </a:t>
-            </a:r>
-            <a:r>
-              <a:rPr lang="en-US" dirty="0" smtClean="0"/>
-              <a:t>updates will arrive to the same node</a:t>
+              <a:t>ll updates will arrive to the same node</a:t>
             </a:r>
             <a:endParaRPr lang="en-US" dirty="0"/>
           </a:p>
@@ -9900,11 +9871,7 @@
           <a:p>
             <a:r>
               <a:rPr lang="en-US" dirty="0" smtClean="0"/>
-              <a:t>Lock </a:t>
-            </a:r>
-            <a:r>
-              <a:rPr lang="en-US" dirty="0" smtClean="0"/>
-              <a:t>the object in memory by version number as the lock key</a:t>
+              <a:t>Lock the object in memory by version number as the lock key</a:t>
             </a:r>
           </a:p>
           <a:p>
@@ -10054,7 +10021,6 @@
               <a:rPr lang="en-US" dirty="0" smtClean="0"/>
               <a:t>A-synchronous computation</a:t>
             </a:r>
-            <a:endParaRPr lang="en-US" dirty="0" smtClean="0"/>
           </a:p>
         </p:txBody>
       </p:sp>
@@ -10428,7 +10394,7 @@
           <p:cNvPr id="5" name="Right Arrow 8">
             <a:extLst>
               <a:ext uri="{FF2B5EF4-FFF2-40B4-BE49-F238E27FC236}">
-                <a16:creationId xmlns="" xmlns:a16="http://schemas.microsoft.com/office/drawing/2014/main" id="{9B6A5C66-3111-42AA-9715-A250ECC26D8A}"/>
+                <a16:creationId xmlns:a16="http://schemas.microsoft.com/office/drawing/2014/main" xmlns="" id="{9B6A5C66-3111-42AA-9715-A250ECC26D8A}"/>
               </a:ext>
             </a:extLst>
           </p:cNvPr>
@@ -10519,7 +10485,7 @@
           <p:cNvPr id="7" name="Right Arrow 8">
             <a:extLst>
               <a:ext uri="{FF2B5EF4-FFF2-40B4-BE49-F238E27FC236}">
-                <a16:creationId xmlns="" xmlns:a16="http://schemas.microsoft.com/office/drawing/2014/main" id="{9B6A5C66-3111-42AA-9715-A250ECC26D8A}"/>
+                <a16:creationId xmlns:a16="http://schemas.microsoft.com/office/drawing/2014/main" xmlns="" id="{9B6A5C66-3111-42AA-9715-A250ECC26D8A}"/>
               </a:ext>
             </a:extLst>
           </p:cNvPr>
@@ -10567,7 +10533,7 @@
           <p:cNvPr id="9" name="Right Arrow 8">
             <a:extLst>
               <a:ext uri="{FF2B5EF4-FFF2-40B4-BE49-F238E27FC236}">
-                <a16:creationId xmlns="" xmlns:a16="http://schemas.microsoft.com/office/drawing/2014/main" id="{9B6A5C66-3111-42AA-9715-A250ECC26D8A}"/>
+                <a16:creationId xmlns:a16="http://schemas.microsoft.com/office/drawing/2014/main" xmlns="" id="{9B6A5C66-3111-42AA-9715-A250ECC26D8A}"/>
               </a:ext>
             </a:extLst>
           </p:cNvPr>
@@ -10704,7 +10670,7 @@
           <p:cNvPr id="11" name="Right Arrow 8">
             <a:extLst>
               <a:ext uri="{FF2B5EF4-FFF2-40B4-BE49-F238E27FC236}">
-                <a16:creationId xmlns="" xmlns:a16="http://schemas.microsoft.com/office/drawing/2014/main" id="{9B6A5C66-3111-42AA-9715-A250ECC26D8A}"/>
+                <a16:creationId xmlns:a16="http://schemas.microsoft.com/office/drawing/2014/main" xmlns="" id="{9B6A5C66-3111-42AA-9715-A250ECC26D8A}"/>
               </a:ext>
             </a:extLst>
           </p:cNvPr>
@@ -10798,7 +10764,7 @@
           <p:cNvPr id="13" name="Right Arrow 8">
             <a:extLst>
               <a:ext uri="{FF2B5EF4-FFF2-40B4-BE49-F238E27FC236}">
-                <a16:creationId xmlns="" xmlns:a16="http://schemas.microsoft.com/office/drawing/2014/main" id="{9B6A5C66-3111-42AA-9715-A250ECC26D8A}"/>
+                <a16:creationId xmlns:a16="http://schemas.microsoft.com/office/drawing/2014/main" xmlns="" id="{9B6A5C66-3111-42AA-9715-A250ECC26D8A}"/>
               </a:ext>
             </a:extLst>
           </p:cNvPr>
@@ -10889,7 +10855,7 @@
           <p:cNvPr id="15" name="Right Arrow 8">
             <a:extLst>
               <a:ext uri="{FF2B5EF4-FFF2-40B4-BE49-F238E27FC236}">
-                <a16:creationId xmlns="" xmlns:a16="http://schemas.microsoft.com/office/drawing/2014/main" id="{9B6A5C66-3111-42AA-9715-A250ECC26D8A}"/>
+                <a16:creationId xmlns:a16="http://schemas.microsoft.com/office/drawing/2014/main" xmlns="" id="{9B6A5C66-3111-42AA-9715-A250ECC26D8A}"/>
               </a:ext>
             </a:extLst>
           </p:cNvPr>
@@ -10980,7 +10946,7 @@
           <p:cNvPr id="17" name="Right Arrow 8">
             <a:extLst>
               <a:ext uri="{FF2B5EF4-FFF2-40B4-BE49-F238E27FC236}">
-                <a16:creationId xmlns="" xmlns:a16="http://schemas.microsoft.com/office/drawing/2014/main" id="{9B6A5C66-3111-42AA-9715-A250ECC26D8A}"/>
+                <a16:creationId xmlns:a16="http://schemas.microsoft.com/office/drawing/2014/main" xmlns="" id="{9B6A5C66-3111-42AA-9715-A250ECC26D8A}"/>
               </a:ext>
             </a:extLst>
           </p:cNvPr>
@@ -11342,11 +11308,7 @@
           <a:p>
             <a:r>
               <a:rPr lang="en-US" dirty="0" smtClean="0"/>
-              <a:t>Pros </a:t>
-            </a:r>
-            <a:r>
-              <a:rPr lang="en-US" dirty="0" smtClean="0"/>
-              <a:t>– </a:t>
+              <a:t>Pros – </a:t>
             </a:r>
             <a:endParaRPr lang="he-IL" dirty="0" smtClean="0"/>
           </a:p>
@@ -11354,15 +11316,7 @@
             <a:pPr lvl="1"/>
             <a:r>
               <a:rPr lang="en-US" dirty="0" smtClean="0"/>
-              <a:t>Will </a:t>
-            </a:r>
-            <a:r>
-              <a:rPr lang="en-US" dirty="0" smtClean="0"/>
-              <a:t>guaranty </a:t>
-            </a:r>
-            <a:r>
-              <a:rPr lang="en-US" dirty="0" smtClean="0"/>
-              <a:t>consistency</a:t>
+              <a:t>Will guaranty consistency</a:t>
             </a:r>
             <a:endParaRPr lang="he-IL" dirty="0" smtClean="0"/>
           </a:p>
@@ -11372,7 +11326,6 @@
               <a:rPr lang="en-US" dirty="0" smtClean="0"/>
               <a:t>Out of the box cluster support</a:t>
             </a:r>
-            <a:endParaRPr lang="en-US" dirty="0" smtClean="0"/>
           </a:p>
           <a:p>
             <a:r>
@@ -11821,11 +11774,7 @@
           <a:p>
             <a:r>
               <a:rPr lang="en-US" dirty="0" smtClean="0"/>
-              <a:t>Usage </a:t>
-            </a:r>
-            <a:r>
-              <a:rPr lang="en-US" dirty="0" smtClean="0"/>
-              <a:t>a function from third party library – internal implementation performs asynchronous operations</a:t>
+              <a:t>Usage a function from third party library – internal implementation performs asynchronous operations</a:t>
             </a:r>
             <a:endParaRPr lang="he-IL" dirty="0" smtClean="0"/>
           </a:p>
@@ -12399,7 +12348,7 @@
   <a:extraClrSchemeLst/>
   <a:extLst>
     <a:ext uri="{05A4C25C-085E-4340-85A3-A5531E510DB2}">
-      <thm15:themeFamily xmlns="" xmlns:thm15="http://schemas.microsoft.com/office/thememl/2012/main" name="Facet" id="{C0C680CD-088A-49FC-A102-D699147F32B2}" vid="{CFBC31BA-B70F-4F30-BCAA-4F3011E16C4D}"/>
+      <thm15:themeFamily xmlns:thm15="http://schemas.microsoft.com/office/thememl/2012/main" xmlns="" name="Facet" id="{C0C680CD-088A-49FC-A102-D699147F32B2}" vid="{CFBC31BA-B70F-4F30-BCAA-4F3011E16C4D}"/>
     </a:ext>
   </a:extLst>
 </a:theme>

</xml_diff>